<commit_message>
fix opcua form and colors
</commit_message>
<xml_diff>
--- a/material/wot-figures.pptx
+++ b/material/wot-figures.pptx
@@ -293,7 +293,7 @@
           <a:p>
             <a:fld id="{48625F1A-881B-6444-B2A3-F9B97C7D91D9}" type="datetimeFigureOut">
               <a:rPr lang="en-US" smtClean="0"/>
-              <a:t>8/15/2023</a:t>
+              <a:t>8/22/23</a:t>
             </a:fld>
             <a:endParaRPr lang="en-US"/>
           </a:p>
@@ -493,7 +493,7 @@
           <a:p>
             <a:fld id="{48625F1A-881B-6444-B2A3-F9B97C7D91D9}" type="datetimeFigureOut">
               <a:rPr lang="en-US" smtClean="0"/>
-              <a:t>8/15/2023</a:t>
+              <a:t>8/22/23</a:t>
             </a:fld>
             <a:endParaRPr lang="en-US"/>
           </a:p>
@@ -703,7 +703,7 @@
           <a:p>
             <a:fld id="{48625F1A-881B-6444-B2A3-F9B97C7D91D9}" type="datetimeFigureOut">
               <a:rPr lang="en-US" smtClean="0"/>
-              <a:t>8/15/2023</a:t>
+              <a:t>8/22/23</a:t>
             </a:fld>
             <a:endParaRPr lang="en-US"/>
           </a:p>
@@ -903,7 +903,7 @@
           <a:p>
             <a:fld id="{48625F1A-881B-6444-B2A3-F9B97C7D91D9}" type="datetimeFigureOut">
               <a:rPr lang="en-US" smtClean="0"/>
-              <a:t>8/15/2023</a:t>
+              <a:t>8/22/23</a:t>
             </a:fld>
             <a:endParaRPr lang="en-US"/>
           </a:p>
@@ -1179,7 +1179,7 @@
           <a:p>
             <a:fld id="{48625F1A-881B-6444-B2A3-F9B97C7D91D9}" type="datetimeFigureOut">
               <a:rPr lang="en-US" smtClean="0"/>
-              <a:t>8/15/2023</a:t>
+              <a:t>8/22/23</a:t>
             </a:fld>
             <a:endParaRPr lang="en-US"/>
           </a:p>
@@ -1447,7 +1447,7 @@
           <a:p>
             <a:fld id="{48625F1A-881B-6444-B2A3-F9B97C7D91D9}" type="datetimeFigureOut">
               <a:rPr lang="en-US" smtClean="0"/>
-              <a:t>8/15/2023</a:t>
+              <a:t>8/22/23</a:t>
             </a:fld>
             <a:endParaRPr lang="en-US"/>
           </a:p>
@@ -1862,7 +1862,7 @@
           <a:p>
             <a:fld id="{48625F1A-881B-6444-B2A3-F9B97C7D91D9}" type="datetimeFigureOut">
               <a:rPr lang="en-US" smtClean="0"/>
-              <a:t>8/15/2023</a:t>
+              <a:t>8/22/23</a:t>
             </a:fld>
             <a:endParaRPr lang="en-US"/>
           </a:p>
@@ -2004,7 +2004,7 @@
           <a:p>
             <a:fld id="{48625F1A-881B-6444-B2A3-F9B97C7D91D9}" type="datetimeFigureOut">
               <a:rPr lang="en-US" smtClean="0"/>
-              <a:t>8/15/2023</a:t>
+              <a:t>8/22/23</a:t>
             </a:fld>
             <a:endParaRPr lang="en-US"/>
           </a:p>
@@ -2117,7 +2117,7 @@
           <a:p>
             <a:fld id="{48625F1A-881B-6444-B2A3-F9B97C7D91D9}" type="datetimeFigureOut">
               <a:rPr lang="en-US" smtClean="0"/>
-              <a:t>8/15/2023</a:t>
+              <a:t>8/22/23</a:t>
             </a:fld>
             <a:endParaRPr lang="en-US"/>
           </a:p>
@@ -2430,7 +2430,7 @@
           <a:p>
             <a:fld id="{48625F1A-881B-6444-B2A3-F9B97C7D91D9}" type="datetimeFigureOut">
               <a:rPr lang="en-US" smtClean="0"/>
-              <a:t>8/15/2023</a:t>
+              <a:t>8/22/23</a:t>
             </a:fld>
             <a:endParaRPr lang="en-US"/>
           </a:p>
@@ -2719,7 +2719,7 @@
           <a:p>
             <a:fld id="{48625F1A-881B-6444-B2A3-F9B97C7D91D9}" type="datetimeFigureOut">
               <a:rPr lang="en-US" smtClean="0"/>
-              <a:t>8/15/2023</a:t>
+              <a:t>8/22/23</a:t>
             </a:fld>
             <a:endParaRPr lang="en-US"/>
           </a:p>
@@ -2962,7 +2962,7 @@
           <a:p>
             <a:fld id="{48625F1A-881B-6444-B2A3-F9B97C7D91D9}" type="datetimeFigureOut">
               <a:rPr lang="en-US" smtClean="0"/>
-              <a:t>8/15/2023</a:t>
+              <a:t>8/22/23</a:t>
             </a:fld>
             <a:endParaRPr lang="en-US"/>
           </a:p>
@@ -4314,9 +4314,7 @@
             <a:r>
               <a:rPr lang="en-US" sz="1200" b="1" dirty="0">
                 <a:solidFill>
-                  <a:schemeClr val="accent5">
-                    <a:lumMod val="75000"/>
-                  </a:schemeClr>
+                  <a:srgbClr val="1F4E79"/>
                 </a:solidFill>
                 <a:ea typeface="+mj-ea"/>
                 <a:cs typeface="Arial" pitchFamily="34" charset="0"/>
@@ -4871,7 +4869,7 @@
                 <a:ea typeface="Arial Unicode MS" panose="020B0604020202020204" pitchFamily="34" charset="-128"/>
                 <a:cs typeface="Arial Unicode MS" panose="020B0604020202020204" pitchFamily="34" charset="-128"/>
               </a:rPr>
-              <a:t>OPC-UA</a:t>
+              <a:t>OPC UA</a:t>
             </a:r>
           </a:p>
         </p:txBody>
@@ -6915,7 +6913,7 @@
         </p:nvSpPr>
         <p:spPr>
           <a:xfrm>
-            <a:off x="2458467" y="2133123"/>
+            <a:off x="2458467" y="2116031"/>
             <a:ext cx="537371" cy="257750"/>
           </a:xfrm>
           <a:prstGeom prst="rect">
@@ -6967,7 +6965,7 @@
         </p:nvSpPr>
         <p:spPr>
           <a:xfrm>
-            <a:off x="4930740" y="2133123"/>
+            <a:off x="4930740" y="2116031"/>
             <a:ext cx="537371" cy="257750"/>
           </a:xfrm>
           <a:prstGeom prst="rect">
@@ -7019,7 +7017,7 @@
         </p:nvSpPr>
         <p:spPr>
           <a:xfrm>
-            <a:off x="7355011" y="2133123"/>
+            <a:off x="7355011" y="2120304"/>
             <a:ext cx="537371" cy="257750"/>
           </a:xfrm>
           <a:prstGeom prst="rect">
@@ -10513,6 +10511,9 @@
           <a:prstGeom prst="roundRect">
             <a:avLst/>
           </a:prstGeom>
+          <a:solidFill>
+            <a:srgbClr val="1F4E79"/>
+          </a:solidFill>
         </p:spPr>
         <p:style>
           <a:lnRef idx="2">

</xml_diff>

<commit_message>
fix scale of the robot arm
</commit_message>
<xml_diff>
--- a/material/wot-figures.pptx
+++ b/material/wot-figures.pptx
@@ -7071,8 +7071,8 @@
         </p:nvSpPr>
         <p:spPr bwMode="auto">
           <a:xfrm>
-            <a:off x="4237023" y="3927183"/>
-            <a:ext cx="559810" cy="765245"/>
+            <a:off x="4237023" y="4009384"/>
+            <a:ext cx="559810" cy="683044"/>
           </a:xfrm>
           <a:custGeom>
             <a:avLst/>
@@ -9337,567 +9337,6 @@
           <a:chExt cx="0" cy="0"/>
         </a:xfrm>
       </p:grpSpPr>
-      <p:sp>
-        <p:nvSpPr>
-          <p:cNvPr id="4" name="Freeform 5">
-            <a:extLst>
-              <a:ext uri="{FF2B5EF4-FFF2-40B4-BE49-F238E27FC236}">
-                <a16:creationId xmlns:a16="http://schemas.microsoft.com/office/drawing/2014/main" id="{DEBE660F-300F-F04E-A490-A2AE0BA782A9}"/>
-              </a:ext>
-            </a:extLst>
-          </p:cNvPr>
-          <p:cNvSpPr>
-            <a:spLocks noChangeAspect="1" noEditPoints="1"/>
-          </p:cNvSpPr>
-          <p:nvPr/>
-        </p:nvSpPr>
-        <p:spPr bwMode="auto">
-          <a:xfrm>
-            <a:off x="4624649" y="1591487"/>
-            <a:ext cx="559810" cy="765245"/>
-          </a:xfrm>
-          <a:custGeom>
-            <a:avLst/>
-            <a:gdLst>
-              <a:gd name="T0" fmla="*/ 545 w 545"/>
-              <a:gd name="T1" fmla="*/ 141 h 586"/>
-              <a:gd name="T2" fmla="*/ 538 w 545"/>
-              <a:gd name="T3" fmla="*/ 155 h 586"/>
-              <a:gd name="T4" fmla="*/ 480 w 545"/>
-              <a:gd name="T5" fmla="*/ 67 h 586"/>
-              <a:gd name="T6" fmla="*/ 420 w 545"/>
-              <a:gd name="T7" fmla="*/ 88 h 586"/>
-              <a:gd name="T8" fmla="*/ 407 w 545"/>
-              <a:gd name="T9" fmla="*/ 61 h 586"/>
-              <a:gd name="T10" fmla="*/ 490 w 545"/>
-              <a:gd name="T11" fmla="*/ 37 h 586"/>
-              <a:gd name="T12" fmla="*/ 545 w 545"/>
-              <a:gd name="T13" fmla="*/ 141 h 586"/>
-              <a:gd name="T14" fmla="*/ 376 w 545"/>
-              <a:gd name="T15" fmla="*/ 137 h 586"/>
-              <a:gd name="T16" fmla="*/ 405 w 545"/>
-              <a:gd name="T17" fmla="*/ 126 h 586"/>
-              <a:gd name="T18" fmla="*/ 431 w 545"/>
-              <a:gd name="T19" fmla="*/ 189 h 586"/>
-              <a:gd name="T20" fmla="*/ 530 w 545"/>
-              <a:gd name="T21" fmla="*/ 173 h 586"/>
-              <a:gd name="T22" fmla="*/ 523 w 545"/>
-              <a:gd name="T23" fmla="*/ 188 h 586"/>
-              <a:gd name="T24" fmla="*/ 408 w 545"/>
-              <a:gd name="T25" fmla="*/ 212 h 586"/>
-              <a:gd name="T26" fmla="*/ 375 w 545"/>
-              <a:gd name="T27" fmla="*/ 137 h 586"/>
-              <a:gd name="T28" fmla="*/ 376 w 545"/>
-              <a:gd name="T29" fmla="*/ 137 h 586"/>
-              <a:gd name="T30" fmla="*/ 284 w 545"/>
-              <a:gd name="T31" fmla="*/ 586 h 586"/>
-              <a:gd name="T32" fmla="*/ 68 w 545"/>
-              <a:gd name="T33" fmla="*/ 586 h 586"/>
-              <a:gd name="T34" fmla="*/ 68 w 545"/>
-              <a:gd name="T35" fmla="*/ 401 h 586"/>
-              <a:gd name="T36" fmla="*/ 284 w 545"/>
-              <a:gd name="T37" fmla="*/ 401 h 586"/>
-              <a:gd name="T38" fmla="*/ 284 w 545"/>
-              <a:gd name="T39" fmla="*/ 586 h 586"/>
-              <a:gd name="T40" fmla="*/ 39 w 545"/>
-              <a:gd name="T41" fmla="*/ 78 h 586"/>
-              <a:gd name="T42" fmla="*/ 0 w 545"/>
-              <a:gd name="T43" fmla="*/ 39 h 586"/>
-              <a:gd name="T44" fmla="*/ 39 w 545"/>
-              <a:gd name="T45" fmla="*/ 0 h 586"/>
-              <a:gd name="T46" fmla="*/ 78 w 545"/>
-              <a:gd name="T47" fmla="*/ 39 h 586"/>
-              <a:gd name="T48" fmla="*/ 39 w 545"/>
-              <a:gd name="T49" fmla="*/ 78 h 586"/>
-              <a:gd name="T50" fmla="*/ 376 w 545"/>
-              <a:gd name="T51" fmla="*/ 127 h 586"/>
-              <a:gd name="T52" fmla="*/ 342 w 545"/>
-              <a:gd name="T53" fmla="*/ 93 h 586"/>
-              <a:gd name="T54" fmla="*/ 376 w 545"/>
-              <a:gd name="T55" fmla="*/ 58 h 586"/>
-              <a:gd name="T56" fmla="*/ 411 w 545"/>
-              <a:gd name="T57" fmla="*/ 93 h 586"/>
-              <a:gd name="T58" fmla="*/ 376 w 545"/>
-              <a:gd name="T59" fmla="*/ 127 h 586"/>
-              <a:gd name="T60" fmla="*/ 310 w 545"/>
-              <a:gd name="T61" fmla="*/ 366 h 586"/>
-              <a:gd name="T62" fmla="*/ 284 w 545"/>
-              <a:gd name="T63" fmla="*/ 391 h 586"/>
-              <a:gd name="T64" fmla="*/ 68 w 545"/>
-              <a:gd name="T65" fmla="*/ 391 h 586"/>
-              <a:gd name="T66" fmla="*/ 203 w 545"/>
-              <a:gd name="T67" fmla="*/ 254 h 586"/>
-              <a:gd name="T68" fmla="*/ 264 w 545"/>
-              <a:gd name="T69" fmla="*/ 225 h 586"/>
-              <a:gd name="T70" fmla="*/ 342 w 545"/>
-              <a:gd name="T71" fmla="*/ 303 h 586"/>
-              <a:gd name="T72" fmla="*/ 310 w 545"/>
-              <a:gd name="T73" fmla="*/ 366 h 586"/>
-              <a:gd name="T74" fmla="*/ 264 w 545"/>
-              <a:gd name="T75" fmla="*/ 215 h 586"/>
-              <a:gd name="T76" fmla="*/ 208 w 545"/>
-              <a:gd name="T77" fmla="*/ 235 h 586"/>
-              <a:gd name="T78" fmla="*/ 158 w 545"/>
-              <a:gd name="T79" fmla="*/ 286 h 586"/>
-              <a:gd name="T80" fmla="*/ 23 w 545"/>
-              <a:gd name="T81" fmla="*/ 85 h 586"/>
-              <a:gd name="T82" fmla="*/ 39 w 545"/>
-              <a:gd name="T83" fmla="*/ 88 h 586"/>
-              <a:gd name="T84" fmla="*/ 88 w 545"/>
-              <a:gd name="T85" fmla="*/ 39 h 586"/>
-              <a:gd name="T86" fmla="*/ 87 w 545"/>
-              <a:gd name="T87" fmla="*/ 30 h 586"/>
-              <a:gd name="T88" fmla="*/ 288 w 545"/>
-              <a:gd name="T89" fmla="*/ 218 h 586"/>
-              <a:gd name="T90" fmla="*/ 264 w 545"/>
-              <a:gd name="T91" fmla="*/ 215 h 586"/>
-              <a:gd name="T92" fmla="*/ 332 w 545"/>
-              <a:gd name="T93" fmla="*/ 93 h 586"/>
-              <a:gd name="T94" fmla="*/ 344 w 545"/>
-              <a:gd name="T95" fmla="*/ 123 h 586"/>
-              <a:gd name="T96" fmla="*/ 174 w 545"/>
-              <a:gd name="T97" fmla="*/ 98 h 586"/>
-              <a:gd name="T98" fmla="*/ 75 w 545"/>
-              <a:gd name="T99" fmla="*/ 5 h 586"/>
-              <a:gd name="T100" fmla="*/ 355 w 545"/>
-              <a:gd name="T101" fmla="*/ 54 h 586"/>
-              <a:gd name="T102" fmla="*/ 332 w 545"/>
-              <a:gd name="T103" fmla="*/ 93 h 586"/>
-            </a:gdLst>
-            <a:ahLst/>
-            <a:cxnLst>
-              <a:cxn ang="0">
-                <a:pos x="T0" y="T1"/>
-              </a:cxn>
-              <a:cxn ang="0">
-                <a:pos x="T2" y="T3"/>
-              </a:cxn>
-              <a:cxn ang="0">
-                <a:pos x="T4" y="T5"/>
-              </a:cxn>
-              <a:cxn ang="0">
-                <a:pos x="T6" y="T7"/>
-              </a:cxn>
-              <a:cxn ang="0">
-                <a:pos x="T8" y="T9"/>
-              </a:cxn>
-              <a:cxn ang="0">
-                <a:pos x="T10" y="T11"/>
-              </a:cxn>
-              <a:cxn ang="0">
-                <a:pos x="T12" y="T13"/>
-              </a:cxn>
-              <a:cxn ang="0">
-                <a:pos x="T14" y="T15"/>
-              </a:cxn>
-              <a:cxn ang="0">
-                <a:pos x="T16" y="T17"/>
-              </a:cxn>
-              <a:cxn ang="0">
-                <a:pos x="T18" y="T19"/>
-              </a:cxn>
-              <a:cxn ang="0">
-                <a:pos x="T20" y="T21"/>
-              </a:cxn>
-              <a:cxn ang="0">
-                <a:pos x="T22" y="T23"/>
-              </a:cxn>
-              <a:cxn ang="0">
-                <a:pos x="T24" y="T25"/>
-              </a:cxn>
-              <a:cxn ang="0">
-                <a:pos x="T26" y="T27"/>
-              </a:cxn>
-              <a:cxn ang="0">
-                <a:pos x="T28" y="T29"/>
-              </a:cxn>
-              <a:cxn ang="0">
-                <a:pos x="T30" y="T31"/>
-              </a:cxn>
-              <a:cxn ang="0">
-                <a:pos x="T32" y="T33"/>
-              </a:cxn>
-              <a:cxn ang="0">
-                <a:pos x="T34" y="T35"/>
-              </a:cxn>
-              <a:cxn ang="0">
-                <a:pos x="T36" y="T37"/>
-              </a:cxn>
-              <a:cxn ang="0">
-                <a:pos x="T38" y="T39"/>
-              </a:cxn>
-              <a:cxn ang="0">
-                <a:pos x="T40" y="T41"/>
-              </a:cxn>
-              <a:cxn ang="0">
-                <a:pos x="T42" y="T43"/>
-              </a:cxn>
-              <a:cxn ang="0">
-                <a:pos x="T44" y="T45"/>
-              </a:cxn>
-              <a:cxn ang="0">
-                <a:pos x="T46" y="T47"/>
-              </a:cxn>
-              <a:cxn ang="0">
-                <a:pos x="T48" y="T49"/>
-              </a:cxn>
-              <a:cxn ang="0">
-                <a:pos x="T50" y="T51"/>
-              </a:cxn>
-              <a:cxn ang="0">
-                <a:pos x="T52" y="T53"/>
-              </a:cxn>
-              <a:cxn ang="0">
-                <a:pos x="T54" y="T55"/>
-              </a:cxn>
-              <a:cxn ang="0">
-                <a:pos x="T56" y="T57"/>
-              </a:cxn>
-              <a:cxn ang="0">
-                <a:pos x="T58" y="T59"/>
-              </a:cxn>
-              <a:cxn ang="0">
-                <a:pos x="T60" y="T61"/>
-              </a:cxn>
-              <a:cxn ang="0">
-                <a:pos x="T62" y="T63"/>
-              </a:cxn>
-              <a:cxn ang="0">
-                <a:pos x="T64" y="T65"/>
-              </a:cxn>
-              <a:cxn ang="0">
-                <a:pos x="T66" y="T67"/>
-              </a:cxn>
-              <a:cxn ang="0">
-                <a:pos x="T68" y="T69"/>
-              </a:cxn>
-              <a:cxn ang="0">
-                <a:pos x="T70" y="T71"/>
-              </a:cxn>
-              <a:cxn ang="0">
-                <a:pos x="T72" y="T73"/>
-              </a:cxn>
-              <a:cxn ang="0">
-                <a:pos x="T74" y="T75"/>
-              </a:cxn>
-              <a:cxn ang="0">
-                <a:pos x="T76" y="T77"/>
-              </a:cxn>
-              <a:cxn ang="0">
-                <a:pos x="T78" y="T79"/>
-              </a:cxn>
-              <a:cxn ang="0">
-                <a:pos x="T80" y="T81"/>
-              </a:cxn>
-              <a:cxn ang="0">
-                <a:pos x="T82" y="T83"/>
-              </a:cxn>
-              <a:cxn ang="0">
-                <a:pos x="T84" y="T85"/>
-              </a:cxn>
-              <a:cxn ang="0">
-                <a:pos x="T86" y="T87"/>
-              </a:cxn>
-              <a:cxn ang="0">
-                <a:pos x="T88" y="T89"/>
-              </a:cxn>
-              <a:cxn ang="0">
-                <a:pos x="T90" y="T91"/>
-              </a:cxn>
-              <a:cxn ang="0">
-                <a:pos x="T92" y="T93"/>
-              </a:cxn>
-              <a:cxn ang="0">
-                <a:pos x="T94" y="T95"/>
-              </a:cxn>
-              <a:cxn ang="0">
-                <a:pos x="T96" y="T97"/>
-              </a:cxn>
-              <a:cxn ang="0">
-                <a:pos x="T98" y="T99"/>
-              </a:cxn>
-              <a:cxn ang="0">
-                <a:pos x="T100" y="T101"/>
-              </a:cxn>
-              <a:cxn ang="0">
-                <a:pos x="T102" y="T103"/>
-              </a:cxn>
-            </a:cxnLst>
-            <a:rect l="0" t="0" r="r" b="b"/>
-            <a:pathLst>
-              <a:path w="545" h="586">
-                <a:moveTo>
-                  <a:pt x="545" y="141"/>
-                </a:moveTo>
-                <a:cubicBezTo>
-                  <a:pt x="538" y="155"/>
-                  <a:pt x="538" y="155"/>
-                  <a:pt x="538" y="155"/>
-                </a:cubicBezTo>
-                <a:cubicBezTo>
-                  <a:pt x="480" y="67"/>
-                  <a:pt x="480" y="67"/>
-                  <a:pt x="480" y="67"/>
-                </a:cubicBezTo>
-                <a:cubicBezTo>
-                  <a:pt x="420" y="88"/>
-                  <a:pt x="420" y="88"/>
-                  <a:pt x="420" y="88"/>
-                </a:cubicBezTo>
-                <a:cubicBezTo>
-                  <a:pt x="419" y="78"/>
-                  <a:pt x="414" y="68"/>
-                  <a:pt x="407" y="61"/>
-                </a:cubicBezTo>
-                <a:cubicBezTo>
-                  <a:pt x="490" y="37"/>
-                  <a:pt x="490" y="37"/>
-                  <a:pt x="490" y="37"/>
-                </a:cubicBezTo>
-                <a:lnTo>
-                  <a:pt x="545" y="141"/>
-                </a:lnTo>
-                <a:close/>
-                <a:moveTo>
-                  <a:pt x="376" y="137"/>
-                </a:moveTo>
-                <a:cubicBezTo>
-                  <a:pt x="387" y="137"/>
-                  <a:pt x="397" y="133"/>
-                  <a:pt x="405" y="126"/>
-                </a:cubicBezTo>
-                <a:cubicBezTo>
-                  <a:pt x="431" y="189"/>
-                  <a:pt x="431" y="189"/>
-                  <a:pt x="431" y="189"/>
-                </a:cubicBezTo>
-                <a:cubicBezTo>
-                  <a:pt x="530" y="173"/>
-                  <a:pt x="530" y="173"/>
-                  <a:pt x="530" y="173"/>
-                </a:cubicBezTo>
-                <a:cubicBezTo>
-                  <a:pt x="523" y="188"/>
-                  <a:pt x="523" y="188"/>
-                  <a:pt x="523" y="188"/>
-                </a:cubicBezTo>
-                <a:cubicBezTo>
-                  <a:pt x="408" y="212"/>
-                  <a:pt x="408" y="212"/>
-                  <a:pt x="408" y="212"/>
-                </a:cubicBezTo>
-                <a:cubicBezTo>
-                  <a:pt x="375" y="137"/>
-                  <a:pt x="375" y="137"/>
-                  <a:pt x="375" y="137"/>
-                </a:cubicBezTo>
-                <a:cubicBezTo>
-                  <a:pt x="375" y="137"/>
-                  <a:pt x="376" y="137"/>
-                  <a:pt x="376" y="137"/>
-                </a:cubicBezTo>
-                <a:close/>
-                <a:moveTo>
-                  <a:pt x="284" y="586"/>
-                </a:moveTo>
-                <a:cubicBezTo>
-                  <a:pt x="68" y="586"/>
-                  <a:pt x="68" y="586"/>
-                  <a:pt x="68" y="586"/>
-                </a:cubicBezTo>
-                <a:cubicBezTo>
-                  <a:pt x="68" y="401"/>
-                  <a:pt x="68" y="401"/>
-                  <a:pt x="68" y="401"/>
-                </a:cubicBezTo>
-                <a:cubicBezTo>
-                  <a:pt x="284" y="401"/>
-                  <a:pt x="284" y="401"/>
-                  <a:pt x="284" y="401"/>
-                </a:cubicBezTo>
-                <a:lnTo>
-                  <a:pt x="284" y="586"/>
-                </a:lnTo>
-                <a:close/>
-                <a:moveTo>
-                  <a:pt x="39" y="78"/>
-                </a:moveTo>
-                <a:cubicBezTo>
-                  <a:pt x="18" y="78"/>
-                  <a:pt x="0" y="60"/>
-                  <a:pt x="0" y="39"/>
-                </a:cubicBezTo>
-                <a:cubicBezTo>
-                  <a:pt x="0" y="17"/>
-                  <a:pt x="18" y="0"/>
-                  <a:pt x="39" y="0"/>
-                </a:cubicBezTo>
-                <a:cubicBezTo>
-                  <a:pt x="61" y="0"/>
-                  <a:pt x="78" y="17"/>
-                  <a:pt x="78" y="39"/>
-                </a:cubicBezTo>
-                <a:cubicBezTo>
-                  <a:pt x="78" y="60"/>
-                  <a:pt x="61" y="78"/>
-                  <a:pt x="39" y="78"/>
-                </a:cubicBezTo>
-                <a:close/>
-                <a:moveTo>
-                  <a:pt x="376" y="127"/>
-                </a:moveTo>
-                <a:cubicBezTo>
-                  <a:pt x="358" y="127"/>
-                  <a:pt x="342" y="111"/>
-                  <a:pt x="342" y="93"/>
-                </a:cubicBezTo>
-                <a:cubicBezTo>
-                  <a:pt x="342" y="74"/>
-                  <a:pt x="358" y="58"/>
-                  <a:pt x="376" y="58"/>
-                </a:cubicBezTo>
-                <a:cubicBezTo>
-                  <a:pt x="395" y="58"/>
-                  <a:pt x="411" y="74"/>
-                  <a:pt x="411" y="93"/>
-                </a:cubicBezTo>
-                <a:cubicBezTo>
-                  <a:pt x="411" y="111"/>
-                  <a:pt x="395" y="127"/>
-                  <a:pt x="376" y="127"/>
-                </a:cubicBezTo>
-                <a:close/>
-                <a:moveTo>
-                  <a:pt x="310" y="366"/>
-                </a:moveTo>
-                <a:cubicBezTo>
-                  <a:pt x="284" y="391"/>
-                  <a:pt x="284" y="391"/>
-                  <a:pt x="284" y="391"/>
-                </a:cubicBezTo>
-                <a:cubicBezTo>
-                  <a:pt x="68" y="391"/>
-                  <a:pt x="68" y="391"/>
-                  <a:pt x="68" y="391"/>
-                </a:cubicBezTo>
-                <a:cubicBezTo>
-                  <a:pt x="203" y="254"/>
-                  <a:pt x="203" y="254"/>
-                  <a:pt x="203" y="254"/>
-                </a:cubicBezTo>
-                <a:cubicBezTo>
-                  <a:pt x="217" y="236"/>
-                  <a:pt x="239" y="225"/>
-                  <a:pt x="264" y="225"/>
-                </a:cubicBezTo>
-                <a:cubicBezTo>
-                  <a:pt x="307" y="225"/>
-                  <a:pt x="342" y="260"/>
-                  <a:pt x="342" y="303"/>
-                </a:cubicBezTo>
-                <a:cubicBezTo>
-                  <a:pt x="342" y="329"/>
-                  <a:pt x="330" y="351"/>
-                  <a:pt x="310" y="366"/>
-                </a:cubicBezTo>
-                <a:close/>
-                <a:moveTo>
-                  <a:pt x="264" y="215"/>
-                </a:moveTo>
-                <a:cubicBezTo>
-                  <a:pt x="243" y="215"/>
-                  <a:pt x="223" y="222"/>
-                  <a:pt x="208" y="235"/>
-                </a:cubicBezTo>
-                <a:cubicBezTo>
-                  <a:pt x="203" y="239"/>
-                  <a:pt x="158" y="286"/>
-                  <a:pt x="158" y="286"/>
-                </a:cubicBezTo>
-                <a:cubicBezTo>
-                  <a:pt x="23" y="85"/>
-                  <a:pt x="23" y="85"/>
-                  <a:pt x="23" y="85"/>
-                </a:cubicBezTo>
-                <a:cubicBezTo>
-                  <a:pt x="28" y="87"/>
-                  <a:pt x="34" y="88"/>
-                  <a:pt x="39" y="88"/>
-                </a:cubicBezTo>
-                <a:cubicBezTo>
-                  <a:pt x="66" y="88"/>
-                  <a:pt x="88" y="66"/>
-                  <a:pt x="88" y="39"/>
-                </a:cubicBezTo>
-                <a:cubicBezTo>
-                  <a:pt x="88" y="36"/>
-                  <a:pt x="88" y="33"/>
-                  <a:pt x="87" y="30"/>
-                </a:cubicBezTo>
-                <a:cubicBezTo>
-                  <a:pt x="288" y="218"/>
-                  <a:pt x="288" y="218"/>
-                  <a:pt x="288" y="218"/>
-                </a:cubicBezTo>
-                <a:cubicBezTo>
-                  <a:pt x="280" y="216"/>
-                  <a:pt x="272" y="215"/>
-                  <a:pt x="264" y="215"/>
-                </a:cubicBezTo>
-                <a:close/>
-                <a:moveTo>
-                  <a:pt x="332" y="93"/>
-                </a:moveTo>
-                <a:cubicBezTo>
-                  <a:pt x="332" y="104"/>
-                  <a:pt x="337" y="115"/>
-                  <a:pt x="344" y="123"/>
-                </a:cubicBezTo>
-                <a:cubicBezTo>
-                  <a:pt x="174" y="98"/>
-                  <a:pt x="174" y="98"/>
-                  <a:pt x="174" y="98"/>
-                </a:cubicBezTo>
-                <a:cubicBezTo>
-                  <a:pt x="75" y="5"/>
-                  <a:pt x="75" y="5"/>
-                  <a:pt x="75" y="5"/>
-                </a:cubicBezTo>
-                <a:cubicBezTo>
-                  <a:pt x="355" y="54"/>
-                  <a:pt x="355" y="54"/>
-                  <a:pt x="355" y="54"/>
-                </a:cubicBezTo>
-                <a:cubicBezTo>
-                  <a:pt x="342" y="61"/>
-                  <a:pt x="332" y="76"/>
-                  <a:pt x="332" y="93"/>
-                </a:cubicBezTo>
-                <a:close/>
-              </a:path>
-            </a:pathLst>
-          </a:custGeom>
-          <a:solidFill>
-            <a:schemeClr val="accent5">
-              <a:lumMod val="75000"/>
-            </a:schemeClr>
-          </a:solidFill>
-          <a:ln>
-            <a:noFill/>
-          </a:ln>
-        </p:spPr>
-        <p:txBody>
-          <a:bodyPr vert="horz" wrap="square" lIns="91418" tIns="45709" rIns="91418" bIns="45709" numCol="1" anchor="t" anchorCtr="0" compatLnSpc="1">
-            <a:prstTxWarp prst="textNoShape">
-              <a:avLst/>
-            </a:prstTxWarp>
-          </a:bodyPr>
-          <a:lstStyle/>
-          <a:p>
-            <a:endParaRPr lang="en-US" dirty="0"/>
-          </a:p>
-        </p:txBody>
-      </p:sp>
       <p:pic>
         <p:nvPicPr>
           <p:cNvPr id="5" name="Grafik 4" descr="Thermometer mit einfarbiger Füllung">
@@ -10749,167 +10188,12 @@
           </a:p>
         </p:txBody>
       </p:sp>
-    </p:spTree>
-    <p:extLst>
-      <p:ext uri="{BB962C8B-B14F-4D97-AF65-F5344CB8AC3E}">
-        <p14:creationId xmlns:p14="http://schemas.microsoft.com/office/powerpoint/2010/main" val="1130571884"/>
-      </p:ext>
-    </p:extLst>
-  </p:cSld>
-  <p:clrMapOvr>
-    <a:masterClrMapping/>
-  </p:clrMapOvr>
-  <p:timing>
-    <p:tnLst>
-      <p:par>
-        <p:cTn id="1" dur="indefinite" restart="never" nodeType="tmRoot">
-          <p:childTnLst>
-            <p:seq concurrent="1" nextAc="seek">
-              <p:cTn id="2" dur="indefinite" nodeType="mainSeq">
-                <p:childTnLst>
-                  <p:par>
-                    <p:cTn id="3" fill="hold">
-                      <p:stCondLst>
-                        <p:cond delay="indefinite"/>
-                      </p:stCondLst>
-                      <p:childTnLst>
-                        <p:par>
-                          <p:cTn id="4" fill="hold">
-                            <p:stCondLst>
-                              <p:cond delay="0"/>
-                            </p:stCondLst>
-                            <p:childTnLst>
-                              <p:par>
-                                <p:cTn id="5" presetID="1" presetClass="entr" presetSubtype="0" fill="hold" grpId="0" nodeType="clickEffect">
-                                  <p:stCondLst>
-                                    <p:cond delay="0"/>
-                                  </p:stCondLst>
-                                  <p:childTnLst>
-                                    <p:set>
-                                      <p:cBhvr>
-                                        <p:cTn id="6" dur="1" fill="hold">
-                                          <p:stCondLst>
-                                            <p:cond delay="0"/>
-                                          </p:stCondLst>
-                                        </p:cTn>
-                                        <p:tgtEl>
-                                          <p:spTgt spid="4"/>
-                                        </p:tgtEl>
-                                        <p:attrNameLst>
-                                          <p:attrName>style.visibility</p:attrName>
-                                        </p:attrNameLst>
-                                      </p:cBhvr>
-                                      <p:to>
-                                        <p:strVal val="visible"/>
-                                      </p:to>
-                                    </p:set>
-                                  </p:childTnLst>
-                                </p:cTn>
-                              </p:par>
-                            </p:childTnLst>
-                          </p:cTn>
-                        </p:par>
-                      </p:childTnLst>
-                    </p:cTn>
-                  </p:par>
-                </p:childTnLst>
-              </p:cTn>
-              <p:prevCondLst>
-                <p:cond evt="onPrev" delay="0">
-                  <p:tgtEl>
-                    <p:sldTgt/>
-                  </p:tgtEl>
-                </p:cond>
-              </p:prevCondLst>
-              <p:nextCondLst>
-                <p:cond evt="onNext" delay="0">
-                  <p:tgtEl>
-                    <p:sldTgt/>
-                  </p:tgtEl>
-                </p:cond>
-              </p:nextCondLst>
-            </p:seq>
-          </p:childTnLst>
-        </p:cTn>
-      </p:par>
-    </p:tnLst>
-    <p:bldLst>
-      <p:bldP spid="4" grpId="0" animBg="1"/>
-    </p:bldLst>
-  </p:timing>
-</p:sld>
-</file>
-
-<file path=ppt/slides/slide4.xml><?xml version="1.0" encoding="utf-8"?>
-<p:sld xmlns:a="http://schemas.openxmlformats.org/drawingml/2006/main" xmlns:r="http://schemas.openxmlformats.org/officeDocument/2006/relationships" xmlns:p="http://schemas.openxmlformats.org/presentationml/2006/main">
-  <p:cSld>
-    <p:spTree>
-      <p:nvGrpSpPr>
-        <p:cNvPr id="1" name=""/>
-        <p:cNvGrpSpPr/>
-        <p:nvPr/>
-      </p:nvGrpSpPr>
-      <p:grpSpPr>
-        <a:xfrm>
-          <a:off x="0" y="0"/>
-          <a:ext cx="0" cy="0"/>
-          <a:chOff x="0" y="0"/>
-          <a:chExt cx="0" cy="0"/>
-        </a:xfrm>
-      </p:grpSpPr>
-      <p:pic>
-        <p:nvPicPr>
-          <p:cNvPr id="8" name="Picture 2" descr="ThingDescription">
-            <a:extLst>
-              <a:ext uri="{FF2B5EF4-FFF2-40B4-BE49-F238E27FC236}">
-                <a16:creationId xmlns:a16="http://schemas.microsoft.com/office/drawing/2014/main" id="{DD630EFD-5FBC-9044-B598-DE9D3FC6D961}"/>
-              </a:ext>
-            </a:extLst>
-          </p:cNvPr>
-          <p:cNvPicPr>
-            <a:picLocks noChangeAspect="1" noChangeArrowheads="1"/>
-          </p:cNvPicPr>
-          <p:nvPr/>
-        </p:nvPicPr>
-        <p:blipFill>
-          <a:blip r:embed="rId2">
-            <a:extLst>
-              <a:ext uri="{28A0092B-C50C-407E-A947-70E740481C1C}">
-                <a14:useLocalDpi xmlns:a14="http://schemas.microsoft.com/office/drawing/2010/main" val="0"/>
-              </a:ext>
-            </a:extLst>
-          </a:blip>
-          <a:srcRect/>
-          <a:stretch>
-            <a:fillRect/>
-          </a:stretch>
-        </p:blipFill>
-        <p:spPr bwMode="auto">
-          <a:xfrm>
-            <a:off x="2047489" y="2662369"/>
-            <a:ext cx="2277375" cy="2883432"/>
-          </a:xfrm>
-          <a:prstGeom prst="rect">
-            <a:avLst/>
-          </a:prstGeom>
-          <a:noFill/>
-          <a:extLst>
-            <a:ext uri="{909E8E84-426E-40DD-AFC4-6F175D3DCCD1}">
-              <a14:hiddenFill xmlns:a14="http://schemas.microsoft.com/office/drawing/2010/main">
-                <a:solidFill>
-                  <a:srgbClr val="FFFFFF"/>
-                </a:solidFill>
-              </a14:hiddenFill>
-            </a:ext>
-          </a:extLst>
-        </p:spPr>
-      </p:pic>
-      <p:sp>
-        <p:nvSpPr>
-          <p:cNvPr id="9" name="Freeform 5">
-            <a:extLst>
-              <a:ext uri="{FF2B5EF4-FFF2-40B4-BE49-F238E27FC236}">
-                <a16:creationId xmlns:a16="http://schemas.microsoft.com/office/drawing/2014/main" id="{AFEAF625-7EEC-544A-84A6-DE8169DEC4F6}"/>
+      <p:sp>
+        <p:nvSpPr>
+          <p:cNvPr id="2" name="Freeform 5">
+            <a:extLst>
+              <a:ext uri="{FF2B5EF4-FFF2-40B4-BE49-F238E27FC236}">
+                <a16:creationId xmlns:a16="http://schemas.microsoft.com/office/drawing/2014/main" id="{113D8EFF-223E-F884-9811-FAC0AD3E86D1}"/>
               </a:ext>
             </a:extLst>
           </p:cNvPr>
@@ -10920,8 +10204,8 @@
         </p:nvSpPr>
         <p:spPr bwMode="auto">
           <a:xfrm>
-            <a:off x="1767584" y="4940168"/>
-            <a:ext cx="559810" cy="765245"/>
+            <a:off x="4622824" y="1669248"/>
+            <a:ext cx="559810" cy="683044"/>
           </a:xfrm>
           <a:custGeom>
             <a:avLst/>
@@ -11468,6 +10752,722 @@
     </p:spTree>
     <p:extLst>
       <p:ext uri="{BB962C8B-B14F-4D97-AF65-F5344CB8AC3E}">
+        <p14:creationId xmlns:p14="http://schemas.microsoft.com/office/powerpoint/2010/main" val="1130571884"/>
+      </p:ext>
+    </p:extLst>
+  </p:cSld>
+  <p:clrMapOvr>
+    <a:masterClrMapping/>
+  </p:clrMapOvr>
+  <p:timing>
+    <p:tnLst>
+      <p:par>
+        <p:cTn id="1" dur="indefinite" restart="never" nodeType="tmRoot">
+          <p:childTnLst>
+            <p:seq concurrent="1" nextAc="seek">
+              <p:cTn id="2" dur="indefinite" nodeType="mainSeq">
+                <p:childTnLst>
+                  <p:par>
+                    <p:cTn id="3" fill="hold">
+                      <p:stCondLst>
+                        <p:cond delay="indefinite"/>
+                      </p:stCondLst>
+                      <p:childTnLst>
+                        <p:par>
+                          <p:cTn id="4" fill="hold">
+                            <p:stCondLst>
+                              <p:cond delay="0"/>
+                            </p:stCondLst>
+                            <p:childTnLst>
+                              <p:par>
+                                <p:cTn id="5" presetID="1" presetClass="entr" presetSubtype="0" fill="hold" grpId="0" nodeType="clickEffect">
+                                  <p:stCondLst>
+                                    <p:cond delay="0"/>
+                                  </p:stCondLst>
+                                  <p:childTnLst>
+                                    <p:set>
+                                      <p:cBhvr>
+                                        <p:cTn id="6" dur="1" fill="hold">
+                                          <p:stCondLst>
+                                            <p:cond delay="0"/>
+                                          </p:stCondLst>
+                                        </p:cTn>
+                                        <p:tgtEl>
+                                          <p:spTgt spid="2"/>
+                                        </p:tgtEl>
+                                        <p:attrNameLst>
+                                          <p:attrName>style.visibility</p:attrName>
+                                        </p:attrNameLst>
+                                      </p:cBhvr>
+                                      <p:to>
+                                        <p:strVal val="visible"/>
+                                      </p:to>
+                                    </p:set>
+                                  </p:childTnLst>
+                                </p:cTn>
+                              </p:par>
+                            </p:childTnLst>
+                          </p:cTn>
+                        </p:par>
+                      </p:childTnLst>
+                    </p:cTn>
+                  </p:par>
+                </p:childTnLst>
+              </p:cTn>
+              <p:prevCondLst>
+                <p:cond evt="onPrev" delay="0">
+                  <p:tgtEl>
+                    <p:sldTgt/>
+                  </p:tgtEl>
+                </p:cond>
+              </p:prevCondLst>
+              <p:nextCondLst>
+                <p:cond evt="onNext" delay="0">
+                  <p:tgtEl>
+                    <p:sldTgt/>
+                  </p:tgtEl>
+                </p:cond>
+              </p:nextCondLst>
+            </p:seq>
+          </p:childTnLst>
+        </p:cTn>
+      </p:par>
+    </p:tnLst>
+    <p:bldLst>
+      <p:bldP spid="2" grpId="0" animBg="1"/>
+    </p:bldLst>
+  </p:timing>
+</p:sld>
+</file>
+
+<file path=ppt/slides/slide4.xml><?xml version="1.0" encoding="utf-8"?>
+<p:sld xmlns:a="http://schemas.openxmlformats.org/drawingml/2006/main" xmlns:r="http://schemas.openxmlformats.org/officeDocument/2006/relationships" xmlns:p="http://schemas.openxmlformats.org/presentationml/2006/main">
+  <p:cSld>
+    <p:spTree>
+      <p:nvGrpSpPr>
+        <p:cNvPr id="1" name=""/>
+        <p:cNvGrpSpPr/>
+        <p:nvPr/>
+      </p:nvGrpSpPr>
+      <p:grpSpPr>
+        <a:xfrm>
+          <a:off x="0" y="0"/>
+          <a:ext cx="0" cy="0"/>
+          <a:chOff x="0" y="0"/>
+          <a:chExt cx="0" cy="0"/>
+        </a:xfrm>
+      </p:grpSpPr>
+      <p:pic>
+        <p:nvPicPr>
+          <p:cNvPr id="8" name="Picture 2" descr="ThingDescription">
+            <a:extLst>
+              <a:ext uri="{FF2B5EF4-FFF2-40B4-BE49-F238E27FC236}">
+                <a16:creationId xmlns:a16="http://schemas.microsoft.com/office/drawing/2014/main" id="{DD630EFD-5FBC-9044-B598-DE9D3FC6D961}"/>
+              </a:ext>
+            </a:extLst>
+          </p:cNvPr>
+          <p:cNvPicPr>
+            <a:picLocks noChangeAspect="1" noChangeArrowheads="1"/>
+          </p:cNvPicPr>
+          <p:nvPr/>
+        </p:nvPicPr>
+        <p:blipFill>
+          <a:blip r:embed="rId2">
+            <a:extLst>
+              <a:ext uri="{28A0092B-C50C-407E-A947-70E740481C1C}">
+                <a14:useLocalDpi xmlns:a14="http://schemas.microsoft.com/office/drawing/2010/main" val="0"/>
+              </a:ext>
+            </a:extLst>
+          </a:blip>
+          <a:srcRect/>
+          <a:stretch>
+            <a:fillRect/>
+          </a:stretch>
+        </p:blipFill>
+        <p:spPr bwMode="auto">
+          <a:xfrm>
+            <a:off x="2047489" y="2662369"/>
+            <a:ext cx="2277375" cy="2883432"/>
+          </a:xfrm>
+          <a:prstGeom prst="rect">
+            <a:avLst/>
+          </a:prstGeom>
+          <a:noFill/>
+          <a:extLst>
+            <a:ext uri="{909E8E84-426E-40DD-AFC4-6F175D3DCCD1}">
+              <a14:hiddenFill xmlns:a14="http://schemas.microsoft.com/office/drawing/2010/main">
+                <a:solidFill>
+                  <a:srgbClr val="FFFFFF"/>
+                </a:solidFill>
+              </a14:hiddenFill>
+            </a:ext>
+          </a:extLst>
+        </p:spPr>
+      </p:pic>
+      <p:sp>
+        <p:nvSpPr>
+          <p:cNvPr id="2" name="Freeform 5">
+            <a:extLst>
+              <a:ext uri="{FF2B5EF4-FFF2-40B4-BE49-F238E27FC236}">
+                <a16:creationId xmlns:a16="http://schemas.microsoft.com/office/drawing/2014/main" id="{DFEA4BCC-B827-E1DE-7C35-B2675CFC3236}"/>
+              </a:ext>
+            </a:extLst>
+          </p:cNvPr>
+          <p:cNvSpPr>
+            <a:spLocks noChangeAspect="1" noEditPoints="1"/>
+          </p:cNvSpPr>
+          <p:nvPr/>
+        </p:nvSpPr>
+        <p:spPr bwMode="auto">
+          <a:xfrm>
+            <a:off x="1767584" y="4985660"/>
+            <a:ext cx="559810" cy="683044"/>
+          </a:xfrm>
+          <a:custGeom>
+            <a:avLst/>
+            <a:gdLst>
+              <a:gd name="T0" fmla="*/ 545 w 545"/>
+              <a:gd name="T1" fmla="*/ 141 h 586"/>
+              <a:gd name="T2" fmla="*/ 538 w 545"/>
+              <a:gd name="T3" fmla="*/ 155 h 586"/>
+              <a:gd name="T4" fmla="*/ 480 w 545"/>
+              <a:gd name="T5" fmla="*/ 67 h 586"/>
+              <a:gd name="T6" fmla="*/ 420 w 545"/>
+              <a:gd name="T7" fmla="*/ 88 h 586"/>
+              <a:gd name="T8" fmla="*/ 407 w 545"/>
+              <a:gd name="T9" fmla="*/ 61 h 586"/>
+              <a:gd name="T10" fmla="*/ 490 w 545"/>
+              <a:gd name="T11" fmla="*/ 37 h 586"/>
+              <a:gd name="T12" fmla="*/ 545 w 545"/>
+              <a:gd name="T13" fmla="*/ 141 h 586"/>
+              <a:gd name="T14" fmla="*/ 376 w 545"/>
+              <a:gd name="T15" fmla="*/ 137 h 586"/>
+              <a:gd name="T16" fmla="*/ 405 w 545"/>
+              <a:gd name="T17" fmla="*/ 126 h 586"/>
+              <a:gd name="T18" fmla="*/ 431 w 545"/>
+              <a:gd name="T19" fmla="*/ 189 h 586"/>
+              <a:gd name="T20" fmla="*/ 530 w 545"/>
+              <a:gd name="T21" fmla="*/ 173 h 586"/>
+              <a:gd name="T22" fmla="*/ 523 w 545"/>
+              <a:gd name="T23" fmla="*/ 188 h 586"/>
+              <a:gd name="T24" fmla="*/ 408 w 545"/>
+              <a:gd name="T25" fmla="*/ 212 h 586"/>
+              <a:gd name="T26" fmla="*/ 375 w 545"/>
+              <a:gd name="T27" fmla="*/ 137 h 586"/>
+              <a:gd name="T28" fmla="*/ 376 w 545"/>
+              <a:gd name="T29" fmla="*/ 137 h 586"/>
+              <a:gd name="T30" fmla="*/ 284 w 545"/>
+              <a:gd name="T31" fmla="*/ 586 h 586"/>
+              <a:gd name="T32" fmla="*/ 68 w 545"/>
+              <a:gd name="T33" fmla="*/ 586 h 586"/>
+              <a:gd name="T34" fmla="*/ 68 w 545"/>
+              <a:gd name="T35" fmla="*/ 401 h 586"/>
+              <a:gd name="T36" fmla="*/ 284 w 545"/>
+              <a:gd name="T37" fmla="*/ 401 h 586"/>
+              <a:gd name="T38" fmla="*/ 284 w 545"/>
+              <a:gd name="T39" fmla="*/ 586 h 586"/>
+              <a:gd name="T40" fmla="*/ 39 w 545"/>
+              <a:gd name="T41" fmla="*/ 78 h 586"/>
+              <a:gd name="T42" fmla="*/ 0 w 545"/>
+              <a:gd name="T43" fmla="*/ 39 h 586"/>
+              <a:gd name="T44" fmla="*/ 39 w 545"/>
+              <a:gd name="T45" fmla="*/ 0 h 586"/>
+              <a:gd name="T46" fmla="*/ 78 w 545"/>
+              <a:gd name="T47" fmla="*/ 39 h 586"/>
+              <a:gd name="T48" fmla="*/ 39 w 545"/>
+              <a:gd name="T49" fmla="*/ 78 h 586"/>
+              <a:gd name="T50" fmla="*/ 376 w 545"/>
+              <a:gd name="T51" fmla="*/ 127 h 586"/>
+              <a:gd name="T52" fmla="*/ 342 w 545"/>
+              <a:gd name="T53" fmla="*/ 93 h 586"/>
+              <a:gd name="T54" fmla="*/ 376 w 545"/>
+              <a:gd name="T55" fmla="*/ 58 h 586"/>
+              <a:gd name="T56" fmla="*/ 411 w 545"/>
+              <a:gd name="T57" fmla="*/ 93 h 586"/>
+              <a:gd name="T58" fmla="*/ 376 w 545"/>
+              <a:gd name="T59" fmla="*/ 127 h 586"/>
+              <a:gd name="T60" fmla="*/ 310 w 545"/>
+              <a:gd name="T61" fmla="*/ 366 h 586"/>
+              <a:gd name="T62" fmla="*/ 284 w 545"/>
+              <a:gd name="T63" fmla="*/ 391 h 586"/>
+              <a:gd name="T64" fmla="*/ 68 w 545"/>
+              <a:gd name="T65" fmla="*/ 391 h 586"/>
+              <a:gd name="T66" fmla="*/ 203 w 545"/>
+              <a:gd name="T67" fmla="*/ 254 h 586"/>
+              <a:gd name="T68" fmla="*/ 264 w 545"/>
+              <a:gd name="T69" fmla="*/ 225 h 586"/>
+              <a:gd name="T70" fmla="*/ 342 w 545"/>
+              <a:gd name="T71" fmla="*/ 303 h 586"/>
+              <a:gd name="T72" fmla="*/ 310 w 545"/>
+              <a:gd name="T73" fmla="*/ 366 h 586"/>
+              <a:gd name="T74" fmla="*/ 264 w 545"/>
+              <a:gd name="T75" fmla="*/ 215 h 586"/>
+              <a:gd name="T76" fmla="*/ 208 w 545"/>
+              <a:gd name="T77" fmla="*/ 235 h 586"/>
+              <a:gd name="T78" fmla="*/ 158 w 545"/>
+              <a:gd name="T79" fmla="*/ 286 h 586"/>
+              <a:gd name="T80" fmla="*/ 23 w 545"/>
+              <a:gd name="T81" fmla="*/ 85 h 586"/>
+              <a:gd name="T82" fmla="*/ 39 w 545"/>
+              <a:gd name="T83" fmla="*/ 88 h 586"/>
+              <a:gd name="T84" fmla="*/ 88 w 545"/>
+              <a:gd name="T85" fmla="*/ 39 h 586"/>
+              <a:gd name="T86" fmla="*/ 87 w 545"/>
+              <a:gd name="T87" fmla="*/ 30 h 586"/>
+              <a:gd name="T88" fmla="*/ 288 w 545"/>
+              <a:gd name="T89" fmla="*/ 218 h 586"/>
+              <a:gd name="T90" fmla="*/ 264 w 545"/>
+              <a:gd name="T91" fmla="*/ 215 h 586"/>
+              <a:gd name="T92" fmla="*/ 332 w 545"/>
+              <a:gd name="T93" fmla="*/ 93 h 586"/>
+              <a:gd name="T94" fmla="*/ 344 w 545"/>
+              <a:gd name="T95" fmla="*/ 123 h 586"/>
+              <a:gd name="T96" fmla="*/ 174 w 545"/>
+              <a:gd name="T97" fmla="*/ 98 h 586"/>
+              <a:gd name="T98" fmla="*/ 75 w 545"/>
+              <a:gd name="T99" fmla="*/ 5 h 586"/>
+              <a:gd name="T100" fmla="*/ 355 w 545"/>
+              <a:gd name="T101" fmla="*/ 54 h 586"/>
+              <a:gd name="T102" fmla="*/ 332 w 545"/>
+              <a:gd name="T103" fmla="*/ 93 h 586"/>
+            </a:gdLst>
+            <a:ahLst/>
+            <a:cxnLst>
+              <a:cxn ang="0">
+                <a:pos x="T0" y="T1"/>
+              </a:cxn>
+              <a:cxn ang="0">
+                <a:pos x="T2" y="T3"/>
+              </a:cxn>
+              <a:cxn ang="0">
+                <a:pos x="T4" y="T5"/>
+              </a:cxn>
+              <a:cxn ang="0">
+                <a:pos x="T6" y="T7"/>
+              </a:cxn>
+              <a:cxn ang="0">
+                <a:pos x="T8" y="T9"/>
+              </a:cxn>
+              <a:cxn ang="0">
+                <a:pos x="T10" y="T11"/>
+              </a:cxn>
+              <a:cxn ang="0">
+                <a:pos x="T12" y="T13"/>
+              </a:cxn>
+              <a:cxn ang="0">
+                <a:pos x="T14" y="T15"/>
+              </a:cxn>
+              <a:cxn ang="0">
+                <a:pos x="T16" y="T17"/>
+              </a:cxn>
+              <a:cxn ang="0">
+                <a:pos x="T18" y="T19"/>
+              </a:cxn>
+              <a:cxn ang="0">
+                <a:pos x="T20" y="T21"/>
+              </a:cxn>
+              <a:cxn ang="0">
+                <a:pos x="T22" y="T23"/>
+              </a:cxn>
+              <a:cxn ang="0">
+                <a:pos x="T24" y="T25"/>
+              </a:cxn>
+              <a:cxn ang="0">
+                <a:pos x="T26" y="T27"/>
+              </a:cxn>
+              <a:cxn ang="0">
+                <a:pos x="T28" y="T29"/>
+              </a:cxn>
+              <a:cxn ang="0">
+                <a:pos x="T30" y="T31"/>
+              </a:cxn>
+              <a:cxn ang="0">
+                <a:pos x="T32" y="T33"/>
+              </a:cxn>
+              <a:cxn ang="0">
+                <a:pos x="T34" y="T35"/>
+              </a:cxn>
+              <a:cxn ang="0">
+                <a:pos x="T36" y="T37"/>
+              </a:cxn>
+              <a:cxn ang="0">
+                <a:pos x="T38" y="T39"/>
+              </a:cxn>
+              <a:cxn ang="0">
+                <a:pos x="T40" y="T41"/>
+              </a:cxn>
+              <a:cxn ang="0">
+                <a:pos x="T42" y="T43"/>
+              </a:cxn>
+              <a:cxn ang="0">
+                <a:pos x="T44" y="T45"/>
+              </a:cxn>
+              <a:cxn ang="0">
+                <a:pos x="T46" y="T47"/>
+              </a:cxn>
+              <a:cxn ang="0">
+                <a:pos x="T48" y="T49"/>
+              </a:cxn>
+              <a:cxn ang="0">
+                <a:pos x="T50" y="T51"/>
+              </a:cxn>
+              <a:cxn ang="0">
+                <a:pos x="T52" y="T53"/>
+              </a:cxn>
+              <a:cxn ang="0">
+                <a:pos x="T54" y="T55"/>
+              </a:cxn>
+              <a:cxn ang="0">
+                <a:pos x="T56" y="T57"/>
+              </a:cxn>
+              <a:cxn ang="0">
+                <a:pos x="T58" y="T59"/>
+              </a:cxn>
+              <a:cxn ang="0">
+                <a:pos x="T60" y="T61"/>
+              </a:cxn>
+              <a:cxn ang="0">
+                <a:pos x="T62" y="T63"/>
+              </a:cxn>
+              <a:cxn ang="0">
+                <a:pos x="T64" y="T65"/>
+              </a:cxn>
+              <a:cxn ang="0">
+                <a:pos x="T66" y="T67"/>
+              </a:cxn>
+              <a:cxn ang="0">
+                <a:pos x="T68" y="T69"/>
+              </a:cxn>
+              <a:cxn ang="0">
+                <a:pos x="T70" y="T71"/>
+              </a:cxn>
+              <a:cxn ang="0">
+                <a:pos x="T72" y="T73"/>
+              </a:cxn>
+              <a:cxn ang="0">
+                <a:pos x="T74" y="T75"/>
+              </a:cxn>
+              <a:cxn ang="0">
+                <a:pos x="T76" y="T77"/>
+              </a:cxn>
+              <a:cxn ang="0">
+                <a:pos x="T78" y="T79"/>
+              </a:cxn>
+              <a:cxn ang="0">
+                <a:pos x="T80" y="T81"/>
+              </a:cxn>
+              <a:cxn ang="0">
+                <a:pos x="T82" y="T83"/>
+              </a:cxn>
+              <a:cxn ang="0">
+                <a:pos x="T84" y="T85"/>
+              </a:cxn>
+              <a:cxn ang="0">
+                <a:pos x="T86" y="T87"/>
+              </a:cxn>
+              <a:cxn ang="0">
+                <a:pos x="T88" y="T89"/>
+              </a:cxn>
+              <a:cxn ang="0">
+                <a:pos x="T90" y="T91"/>
+              </a:cxn>
+              <a:cxn ang="0">
+                <a:pos x="T92" y="T93"/>
+              </a:cxn>
+              <a:cxn ang="0">
+                <a:pos x="T94" y="T95"/>
+              </a:cxn>
+              <a:cxn ang="0">
+                <a:pos x="T96" y="T97"/>
+              </a:cxn>
+              <a:cxn ang="0">
+                <a:pos x="T98" y="T99"/>
+              </a:cxn>
+              <a:cxn ang="0">
+                <a:pos x="T100" y="T101"/>
+              </a:cxn>
+              <a:cxn ang="0">
+                <a:pos x="T102" y="T103"/>
+              </a:cxn>
+            </a:cxnLst>
+            <a:rect l="0" t="0" r="r" b="b"/>
+            <a:pathLst>
+              <a:path w="545" h="586">
+                <a:moveTo>
+                  <a:pt x="545" y="141"/>
+                </a:moveTo>
+                <a:cubicBezTo>
+                  <a:pt x="538" y="155"/>
+                  <a:pt x="538" y="155"/>
+                  <a:pt x="538" y="155"/>
+                </a:cubicBezTo>
+                <a:cubicBezTo>
+                  <a:pt x="480" y="67"/>
+                  <a:pt x="480" y="67"/>
+                  <a:pt x="480" y="67"/>
+                </a:cubicBezTo>
+                <a:cubicBezTo>
+                  <a:pt x="420" y="88"/>
+                  <a:pt x="420" y="88"/>
+                  <a:pt x="420" y="88"/>
+                </a:cubicBezTo>
+                <a:cubicBezTo>
+                  <a:pt x="419" y="78"/>
+                  <a:pt x="414" y="68"/>
+                  <a:pt x="407" y="61"/>
+                </a:cubicBezTo>
+                <a:cubicBezTo>
+                  <a:pt x="490" y="37"/>
+                  <a:pt x="490" y="37"/>
+                  <a:pt x="490" y="37"/>
+                </a:cubicBezTo>
+                <a:lnTo>
+                  <a:pt x="545" y="141"/>
+                </a:lnTo>
+                <a:close/>
+                <a:moveTo>
+                  <a:pt x="376" y="137"/>
+                </a:moveTo>
+                <a:cubicBezTo>
+                  <a:pt x="387" y="137"/>
+                  <a:pt x="397" y="133"/>
+                  <a:pt x="405" y="126"/>
+                </a:cubicBezTo>
+                <a:cubicBezTo>
+                  <a:pt x="431" y="189"/>
+                  <a:pt x="431" y="189"/>
+                  <a:pt x="431" y="189"/>
+                </a:cubicBezTo>
+                <a:cubicBezTo>
+                  <a:pt x="530" y="173"/>
+                  <a:pt x="530" y="173"/>
+                  <a:pt x="530" y="173"/>
+                </a:cubicBezTo>
+                <a:cubicBezTo>
+                  <a:pt x="523" y="188"/>
+                  <a:pt x="523" y="188"/>
+                  <a:pt x="523" y="188"/>
+                </a:cubicBezTo>
+                <a:cubicBezTo>
+                  <a:pt x="408" y="212"/>
+                  <a:pt x="408" y="212"/>
+                  <a:pt x="408" y="212"/>
+                </a:cubicBezTo>
+                <a:cubicBezTo>
+                  <a:pt x="375" y="137"/>
+                  <a:pt x="375" y="137"/>
+                  <a:pt x="375" y="137"/>
+                </a:cubicBezTo>
+                <a:cubicBezTo>
+                  <a:pt x="375" y="137"/>
+                  <a:pt x="376" y="137"/>
+                  <a:pt x="376" y="137"/>
+                </a:cubicBezTo>
+                <a:close/>
+                <a:moveTo>
+                  <a:pt x="284" y="586"/>
+                </a:moveTo>
+                <a:cubicBezTo>
+                  <a:pt x="68" y="586"/>
+                  <a:pt x="68" y="586"/>
+                  <a:pt x="68" y="586"/>
+                </a:cubicBezTo>
+                <a:cubicBezTo>
+                  <a:pt x="68" y="401"/>
+                  <a:pt x="68" y="401"/>
+                  <a:pt x="68" y="401"/>
+                </a:cubicBezTo>
+                <a:cubicBezTo>
+                  <a:pt x="284" y="401"/>
+                  <a:pt x="284" y="401"/>
+                  <a:pt x="284" y="401"/>
+                </a:cubicBezTo>
+                <a:lnTo>
+                  <a:pt x="284" y="586"/>
+                </a:lnTo>
+                <a:close/>
+                <a:moveTo>
+                  <a:pt x="39" y="78"/>
+                </a:moveTo>
+                <a:cubicBezTo>
+                  <a:pt x="18" y="78"/>
+                  <a:pt x="0" y="60"/>
+                  <a:pt x="0" y="39"/>
+                </a:cubicBezTo>
+                <a:cubicBezTo>
+                  <a:pt x="0" y="17"/>
+                  <a:pt x="18" y="0"/>
+                  <a:pt x="39" y="0"/>
+                </a:cubicBezTo>
+                <a:cubicBezTo>
+                  <a:pt x="61" y="0"/>
+                  <a:pt x="78" y="17"/>
+                  <a:pt x="78" y="39"/>
+                </a:cubicBezTo>
+                <a:cubicBezTo>
+                  <a:pt x="78" y="60"/>
+                  <a:pt x="61" y="78"/>
+                  <a:pt x="39" y="78"/>
+                </a:cubicBezTo>
+                <a:close/>
+                <a:moveTo>
+                  <a:pt x="376" y="127"/>
+                </a:moveTo>
+                <a:cubicBezTo>
+                  <a:pt x="358" y="127"/>
+                  <a:pt x="342" y="111"/>
+                  <a:pt x="342" y="93"/>
+                </a:cubicBezTo>
+                <a:cubicBezTo>
+                  <a:pt x="342" y="74"/>
+                  <a:pt x="358" y="58"/>
+                  <a:pt x="376" y="58"/>
+                </a:cubicBezTo>
+                <a:cubicBezTo>
+                  <a:pt x="395" y="58"/>
+                  <a:pt x="411" y="74"/>
+                  <a:pt x="411" y="93"/>
+                </a:cubicBezTo>
+                <a:cubicBezTo>
+                  <a:pt x="411" y="111"/>
+                  <a:pt x="395" y="127"/>
+                  <a:pt x="376" y="127"/>
+                </a:cubicBezTo>
+                <a:close/>
+                <a:moveTo>
+                  <a:pt x="310" y="366"/>
+                </a:moveTo>
+                <a:cubicBezTo>
+                  <a:pt x="284" y="391"/>
+                  <a:pt x="284" y="391"/>
+                  <a:pt x="284" y="391"/>
+                </a:cubicBezTo>
+                <a:cubicBezTo>
+                  <a:pt x="68" y="391"/>
+                  <a:pt x="68" y="391"/>
+                  <a:pt x="68" y="391"/>
+                </a:cubicBezTo>
+                <a:cubicBezTo>
+                  <a:pt x="203" y="254"/>
+                  <a:pt x="203" y="254"/>
+                  <a:pt x="203" y="254"/>
+                </a:cubicBezTo>
+                <a:cubicBezTo>
+                  <a:pt x="217" y="236"/>
+                  <a:pt x="239" y="225"/>
+                  <a:pt x="264" y="225"/>
+                </a:cubicBezTo>
+                <a:cubicBezTo>
+                  <a:pt x="307" y="225"/>
+                  <a:pt x="342" y="260"/>
+                  <a:pt x="342" y="303"/>
+                </a:cubicBezTo>
+                <a:cubicBezTo>
+                  <a:pt x="342" y="329"/>
+                  <a:pt x="330" y="351"/>
+                  <a:pt x="310" y="366"/>
+                </a:cubicBezTo>
+                <a:close/>
+                <a:moveTo>
+                  <a:pt x="264" y="215"/>
+                </a:moveTo>
+                <a:cubicBezTo>
+                  <a:pt x="243" y="215"/>
+                  <a:pt x="223" y="222"/>
+                  <a:pt x="208" y="235"/>
+                </a:cubicBezTo>
+                <a:cubicBezTo>
+                  <a:pt x="203" y="239"/>
+                  <a:pt x="158" y="286"/>
+                  <a:pt x="158" y="286"/>
+                </a:cubicBezTo>
+                <a:cubicBezTo>
+                  <a:pt x="23" y="85"/>
+                  <a:pt x="23" y="85"/>
+                  <a:pt x="23" y="85"/>
+                </a:cubicBezTo>
+                <a:cubicBezTo>
+                  <a:pt x="28" y="87"/>
+                  <a:pt x="34" y="88"/>
+                  <a:pt x="39" y="88"/>
+                </a:cubicBezTo>
+                <a:cubicBezTo>
+                  <a:pt x="66" y="88"/>
+                  <a:pt x="88" y="66"/>
+                  <a:pt x="88" y="39"/>
+                </a:cubicBezTo>
+                <a:cubicBezTo>
+                  <a:pt x="88" y="36"/>
+                  <a:pt x="88" y="33"/>
+                  <a:pt x="87" y="30"/>
+                </a:cubicBezTo>
+                <a:cubicBezTo>
+                  <a:pt x="288" y="218"/>
+                  <a:pt x="288" y="218"/>
+                  <a:pt x="288" y="218"/>
+                </a:cubicBezTo>
+                <a:cubicBezTo>
+                  <a:pt x="280" y="216"/>
+                  <a:pt x="272" y="215"/>
+                  <a:pt x="264" y="215"/>
+                </a:cubicBezTo>
+                <a:close/>
+                <a:moveTo>
+                  <a:pt x="332" y="93"/>
+                </a:moveTo>
+                <a:cubicBezTo>
+                  <a:pt x="332" y="104"/>
+                  <a:pt x="337" y="115"/>
+                  <a:pt x="344" y="123"/>
+                </a:cubicBezTo>
+                <a:cubicBezTo>
+                  <a:pt x="174" y="98"/>
+                  <a:pt x="174" y="98"/>
+                  <a:pt x="174" y="98"/>
+                </a:cubicBezTo>
+                <a:cubicBezTo>
+                  <a:pt x="75" y="5"/>
+                  <a:pt x="75" y="5"/>
+                  <a:pt x="75" y="5"/>
+                </a:cubicBezTo>
+                <a:cubicBezTo>
+                  <a:pt x="355" y="54"/>
+                  <a:pt x="355" y="54"/>
+                  <a:pt x="355" y="54"/>
+                </a:cubicBezTo>
+                <a:cubicBezTo>
+                  <a:pt x="342" y="61"/>
+                  <a:pt x="332" y="76"/>
+                  <a:pt x="332" y="93"/>
+                </a:cubicBezTo>
+                <a:close/>
+              </a:path>
+            </a:pathLst>
+          </a:custGeom>
+          <a:solidFill>
+            <a:schemeClr val="accent5">
+              <a:lumMod val="75000"/>
+            </a:schemeClr>
+          </a:solidFill>
+          <a:ln>
+            <a:noFill/>
+          </a:ln>
+        </p:spPr>
+        <p:txBody>
+          <a:bodyPr vert="horz" wrap="square" lIns="91418" tIns="45709" rIns="91418" bIns="45709" numCol="1" anchor="t" anchorCtr="0" compatLnSpc="1">
+            <a:prstTxWarp prst="textNoShape">
+              <a:avLst/>
+            </a:prstTxWarp>
+          </a:bodyPr>
+          <a:lstStyle/>
+          <a:p>
+            <a:endParaRPr lang="en-US" dirty="0"/>
+          </a:p>
+        </p:txBody>
+      </p:sp>
+    </p:spTree>
+    <p:extLst>
+      <p:ext uri="{BB962C8B-B14F-4D97-AF65-F5344CB8AC3E}">
         <p14:creationId xmlns:p14="http://schemas.microsoft.com/office/powerpoint/2010/main" val="370734868"/>
       </p:ext>
     </p:extLst>
@@ -11509,7 +11509,7 @@
                                           </p:stCondLst>
                                         </p:cTn>
                                         <p:tgtEl>
-                                          <p:spTgt spid="9"/>
+                                          <p:spTgt spid="2"/>
                                         </p:tgtEl>
                                         <p:attrNameLst>
                                           <p:attrName>style.visibility</p:attrName>
@@ -11550,7 +11550,7 @@
       </p:par>
     </p:tnLst>
     <p:bldLst>
-      <p:bldP spid="9" grpId="0" animBg="1"/>
+      <p:bldP spid="2" grpId="0" animBg="1"/>
     </p:bldLst>
   </p:timing>
 </p:sld>

</xml_diff>